<commit_message>
Edited slides on self-interest and on cost estimate, cost estimate NEEDS to be reviewed before we present.
</commit_message>
<xml_diff>
--- a/projectProposal/presentation_Mike.pptx
+++ b/projectProposal/presentation_Mike.pptx
@@ -12611,13 +12611,229 @@
               <a:buClr>
                 <a:schemeClr val="dk1"/>
               </a:buClr>
+              <a:buSzPct val="100000"/>
+              <a:buFont typeface="Arial"/>
+              <a:buNone/>
+            </a:pPr>
+            <a:r>
+              <a:rPr lang="en-US">
+                <a:solidFill>
+                  <a:srgbClr val="000000"/>
+                </a:solidFill>
+                <a:latin typeface="Arial"/>
+                <a:ea typeface="Arial"/>
+                <a:cs typeface="Arial"/>
+                <a:sym typeface="Arial"/>
+              </a:rPr>
+              <a:t>Supplies</a:t>
+            </a:r>
+          </a:p>
+          <a:p>
+            <a:pPr indent="-139700" lvl="0" marL="342900" marR="0" rtl="0" algn="l">
+              <a:lnSpc>
+                <a:spcPct val="100000"/>
+              </a:lnSpc>
+              <a:spcBef>
+                <a:spcPts val="0"/>
+              </a:spcBef>
+              <a:spcAft>
+                <a:spcPts val="0"/>
+              </a:spcAft>
+              <a:buClr>
+                <a:schemeClr val="dk1"/>
+              </a:buClr>
+              <a:buSzPct val="100000"/>
+              <a:buFont typeface="Arial"/>
+              <a:buNone/>
+            </a:pPr>
+            <a:r>
+              <a:rPr lang="en-US">
+                <a:solidFill>
+                  <a:srgbClr val="000000"/>
+                </a:solidFill>
+                <a:latin typeface="Arial"/>
+                <a:ea typeface="Arial"/>
+                <a:cs typeface="Arial"/>
+                <a:sym typeface="Arial"/>
+              </a:rPr>
+              <a:t>			Microcontrollers			200-500 dollars</a:t>
+            </a:r>
+          </a:p>
+          <a:p>
+            <a:pPr indent="-139700" lvl="0" marL="342900" marR="0" rtl="0" algn="l">
+              <a:lnSpc>
+                <a:spcPct val="100000"/>
+              </a:lnSpc>
+              <a:spcBef>
+                <a:spcPts val="0"/>
+              </a:spcBef>
+              <a:spcAft>
+                <a:spcPts val="0"/>
+              </a:spcAft>
+              <a:buClr>
+                <a:schemeClr val="dk1"/>
+              </a:buClr>
+              <a:buSzPct val="100000"/>
+              <a:buFont typeface="Arial"/>
+              <a:buNone/>
+            </a:pPr>
+            <a:r>
+              <a:rPr lang="en-US">
+                <a:solidFill>
+                  <a:srgbClr val="000000"/>
+                </a:solidFill>
+                <a:latin typeface="Arial"/>
+                <a:ea typeface="Arial"/>
+                <a:cs typeface="Arial"/>
+                <a:sym typeface="Arial"/>
+              </a:rPr>
+              <a:t>			Switches						Negligible	</a:t>
+            </a:r>
+          </a:p>
+          <a:p>
+            <a:pPr indent="-139700" lvl="0" marL="342900" marR="0" rtl="0" algn="l">
+              <a:lnSpc>
+                <a:spcPct val="100000"/>
+              </a:lnSpc>
+              <a:spcBef>
+                <a:spcPts val="0"/>
+              </a:spcBef>
+              <a:spcAft>
+                <a:spcPts val="0"/>
+              </a:spcAft>
+              <a:buClr>
+                <a:schemeClr val="dk1"/>
+              </a:buClr>
+              <a:buSzPct val="100000"/>
+              <a:buFont typeface="Arial"/>
+              <a:buNone/>
+            </a:pPr>
+            <a:r>
+              <a:rPr lang="en-US">
+                <a:solidFill>
+                  <a:srgbClr val="000000"/>
+                </a:solidFill>
+                <a:latin typeface="Arial"/>
+                <a:ea typeface="Arial"/>
+                <a:cs typeface="Arial"/>
+                <a:sym typeface="Arial"/>
+              </a:rPr>
+              <a:t>			Building case				200-500 dollars</a:t>
+            </a:r>
+          </a:p>
+          <a:p>
+            <a:pPr indent="-139700" lvl="0" marL="342900" marR="0" rtl="0" algn="l">
+              <a:lnSpc>
+                <a:spcPct val="100000"/>
+              </a:lnSpc>
+              <a:spcBef>
+                <a:spcPts val="0"/>
+              </a:spcBef>
+              <a:spcAft>
+                <a:spcPts val="0"/>
+              </a:spcAft>
+              <a:buClr>
+                <a:schemeClr val="dk1"/>
+              </a:buClr>
+              <a:buSzPct val="100000"/>
+              <a:buFont typeface="Arial"/>
+              <a:buNone/>
+            </a:pPr>
+            <a:r>
+              <a:rPr lang="en-US">
+                <a:solidFill>
+                  <a:srgbClr val="000000"/>
+                </a:solidFill>
+                <a:latin typeface="Arial"/>
+                <a:ea typeface="Arial"/>
+                <a:cs typeface="Arial"/>
+                <a:sym typeface="Arial"/>
+              </a:rPr>
+              <a:t>			PCB printing					300 dollars</a:t>
+            </a:r>
+          </a:p>
+          <a:p>
+            <a:pPr indent="-139700" lvl="0" marL="342900" marR="0" rtl="0" algn="l">
+              <a:lnSpc>
+                <a:spcPct val="100000"/>
+              </a:lnSpc>
+              <a:spcBef>
+                <a:spcPts val="0"/>
+              </a:spcBef>
+              <a:spcAft>
+                <a:spcPts val="0"/>
+              </a:spcAft>
+              <a:buClr>
+                <a:schemeClr val="dk1"/>
+              </a:buClr>
               <a:buFont typeface="Arial"/>
               <a:buNone/>
             </a:pPr>
             <a:r>
               <a:t/>
             </a:r>
-            <a:endParaRPr b="0" baseline="0" i="0" sz="3200" u="none" cap="none" strike="noStrike">
+            <a:endParaRPr>
+              <a:solidFill>
+                <a:srgbClr val="000000"/>
+              </a:solidFill>
+              <a:latin typeface="Arial"/>
+              <a:ea typeface="Arial"/>
+              <a:cs typeface="Arial"/>
+              <a:sym typeface="Arial"/>
+            </a:endParaRPr>
+          </a:p>
+          <a:p>
+            <a:pPr indent="-139700" lvl="0" marL="342900" marR="0" rtl="0" algn="l">
+              <a:lnSpc>
+                <a:spcPct val="100000"/>
+              </a:lnSpc>
+              <a:spcBef>
+                <a:spcPts val="0"/>
+              </a:spcBef>
+              <a:spcAft>
+                <a:spcPts val="0"/>
+              </a:spcAft>
+              <a:buClr>
+                <a:schemeClr val="dk1"/>
+              </a:buClr>
+              <a:buSzPct val="100000"/>
+              <a:buFont typeface="Arial"/>
+              <a:buNone/>
+            </a:pPr>
+            <a:r>
+              <a:rPr lang="en-US">
+                <a:solidFill>
+                  <a:srgbClr val="000000"/>
+                </a:solidFill>
+                <a:latin typeface="Arial"/>
+                <a:ea typeface="Arial"/>
+                <a:cs typeface="Arial"/>
+                <a:sym typeface="Arial"/>
+              </a:rPr>
+              <a:t>			Total cost						700-1,300 dollars</a:t>
+            </a:r>
+          </a:p>
+          <a:p>
+            <a:pPr indent="-139700" lvl="0" marL="342900" marR="0" rtl="0" algn="l">
+              <a:lnSpc>
+                <a:spcPct val="100000"/>
+              </a:lnSpc>
+              <a:spcBef>
+                <a:spcPts val="0"/>
+              </a:spcBef>
+              <a:spcAft>
+                <a:spcPts val="0"/>
+              </a:spcAft>
+              <a:buClr>
+                <a:schemeClr val="dk1"/>
+              </a:buClr>
+              <a:buFont typeface="Arial"/>
+              <a:buNone/>
+            </a:pPr>
+            <a:r>
+              <a:t/>
+            </a:r>
+            <a:endParaRPr>
               <a:solidFill>
                 <a:srgbClr val="000000"/>
               </a:solidFill>
@@ -13126,6 +13342,68 @@
                 <a:sym typeface="Arial"/>
               </a:rPr>
               <a:t>Interested in Cybersecurity</a:t>
+            </a:r>
+          </a:p>
+          <a:p>
+            <a:pPr indent="-99060" lvl="0" marR="0" rtl="0" algn="l">
+              <a:lnSpc>
+                <a:spcPct val="100000"/>
+              </a:lnSpc>
+              <a:spcBef>
+                <a:spcPts val="4252"/>
+              </a:spcBef>
+              <a:spcAft>
+                <a:spcPts val="0"/>
+              </a:spcAft>
+              <a:buClr>
+                <a:srgbClr val="000000"/>
+              </a:buClr>
+              <a:buSzPct val="100000"/>
+              <a:buFont typeface="Arial"/>
+              <a:buChar char="●"/>
+            </a:pPr>
+            <a:r>
+              <a:rPr lang="en-US">
+                <a:solidFill>
+                  <a:srgbClr val="000000"/>
+                </a:solidFill>
+                <a:latin typeface="Arial"/>
+                <a:ea typeface="Arial"/>
+                <a:cs typeface="Arial"/>
+                <a:sym typeface="Arial"/>
+              </a:rPr>
+              <a:t>Mike Baldwin</a:t>
+            </a:r>
+          </a:p>
+          <a:p>
+            <a:pPr indent="406400" lvl="1" marR="0" rtl="0" algn="l">
+              <a:lnSpc>
+                <a:spcPct val="100000"/>
+              </a:lnSpc>
+              <a:spcBef>
+                <a:spcPts val="4252"/>
+              </a:spcBef>
+              <a:spcAft>
+                <a:spcPts val="0"/>
+              </a:spcAft>
+              <a:buClr>
+                <a:srgbClr val="000000"/>
+              </a:buClr>
+              <a:buSzPct val="75000"/>
+              <a:buFont typeface="Arial"/>
+              <a:buChar char="–"/>
+            </a:pPr>
+            <a:r>
+              <a:rPr lang="en-US">
+                <a:solidFill>
+                  <a:srgbClr val="000000"/>
+                </a:solidFill>
+                <a:latin typeface="Arial"/>
+                <a:ea typeface="Arial"/>
+                <a:cs typeface="Arial"/>
+                <a:sym typeface="Arial"/>
+              </a:rPr>
+              <a:t>Interested in Software Development.</a:t>
             </a:r>
           </a:p>
           <a:p>
@@ -13392,6 +13670,68 @@
                 <a:sym typeface="Arial"/>
               </a:rPr>
               <a:t>Systems engineering, testing</a:t>
+            </a:r>
+          </a:p>
+          <a:p>
+            <a:pPr indent="-99060" lvl="0" marR="0" rtl="0" algn="l">
+              <a:lnSpc>
+                <a:spcPct val="100000"/>
+              </a:lnSpc>
+              <a:spcBef>
+                <a:spcPts val="4252"/>
+              </a:spcBef>
+              <a:spcAft>
+                <a:spcPts val="0"/>
+              </a:spcAft>
+              <a:buClr>
+                <a:srgbClr val="000000"/>
+              </a:buClr>
+              <a:buSzPct val="100000"/>
+              <a:buFont typeface="Arial"/>
+              <a:buChar char="●"/>
+            </a:pPr>
+            <a:r>
+              <a:rPr lang="en-US">
+                <a:solidFill>
+                  <a:srgbClr val="000000"/>
+                </a:solidFill>
+                <a:latin typeface="Arial"/>
+                <a:ea typeface="Arial"/>
+                <a:cs typeface="Arial"/>
+                <a:sym typeface="Arial"/>
+              </a:rPr>
+              <a:t>Mike Baldwin</a:t>
+            </a:r>
+          </a:p>
+          <a:p>
+            <a:pPr indent="406400" lvl="1" marR="0" rtl="0" algn="l">
+              <a:lnSpc>
+                <a:spcPct val="100000"/>
+              </a:lnSpc>
+              <a:spcBef>
+                <a:spcPts val="4252"/>
+              </a:spcBef>
+              <a:spcAft>
+                <a:spcPts val="0"/>
+              </a:spcAft>
+              <a:buClr>
+                <a:srgbClr val="000000"/>
+              </a:buClr>
+              <a:buSzPct val="75000"/>
+              <a:buFont typeface="Arial"/>
+              <a:buChar char="–"/>
+            </a:pPr>
+            <a:r>
+              <a:rPr lang="en-US">
+                <a:solidFill>
+                  <a:srgbClr val="000000"/>
+                </a:solidFill>
+                <a:latin typeface="Arial"/>
+                <a:ea typeface="Arial"/>
+                <a:cs typeface="Arial"/>
+                <a:sym typeface="Arial"/>
+              </a:rPr>
+              <a:t>Microcontrollers, software interface and utility.</a:t>
             </a:r>
           </a:p>
           <a:p>

</xml_diff>